<commit_message>
commit sample code for watchdog
commit sample code for watchdog
</commit_message>
<xml_diff>
--- a/Bai 11/Device tree.pptx
+++ b/Bai 11/Device tree.pptx
@@ -230,7 +230,7 @@
           <a:p>
             <a:fld id="{9DF6B2F8-E390-BD4F-9ACD-789C35D23CE3}" type="datetimeFigureOut">
               <a:rPr lang="en-US" smtClean="0"/>
-              <a:t>8/9/2020</a:t>
+              <a:t>8/10/2020</a:t>
             </a:fld>
             <a:endParaRPr lang="en-US"/>
           </a:p>
@@ -396,7 +396,7 @@
           <a:p>
             <a:fld id="{79FF8F81-D7B9-424E-B993-6D09B3871A4E}" type="datetimeFigureOut">
               <a:rPr lang="en-US" smtClean="0"/>
-              <a:t>8/9/2020</a:t>
+              <a:t>8/10/2020</a:t>
             </a:fld>
             <a:endParaRPr lang="en-US"/>
           </a:p>
@@ -2052,7 +2052,7 @@
           <a:p>
             <a:fld id="{7F3FBE28-58BC-4486-9A8E-6C1F0E326EAB}" type="datetime1">
               <a:rPr lang="en-US" smtClean="0"/>
-              <a:t>8/9/2020</a:t>
+              <a:t>8/10/2020</a:t>
             </a:fld>
             <a:endParaRPr lang="en-US"/>
           </a:p>
@@ -2238,7 +2238,7 @@
           <a:p>
             <a:fld id="{AE5B28C3-1882-4E84-9C82-23BA74B52008}" type="datetime1">
               <a:rPr lang="en-US" smtClean="0"/>
-              <a:t>8/9/2020</a:t>
+              <a:t>8/10/2020</a:t>
             </a:fld>
             <a:endParaRPr lang="en-US"/>
           </a:p>
@@ -2422,7 +2422,7 @@
           <a:p>
             <a:fld id="{945B1917-4DD8-41D3-93A0-974B9DFBBCBF}" type="datetime1">
               <a:rPr lang="en-US" smtClean="0"/>
-              <a:t>8/9/2020</a:t>
+              <a:t>8/10/2020</a:t>
             </a:fld>
             <a:endParaRPr lang="en-US"/>
           </a:p>
@@ -2596,7 +2596,7 @@
           <a:p>
             <a:fld id="{025DB114-CA1C-4405-B4C9-B0D9B62EC79D}" type="datetimeFigureOut">
               <a:rPr lang="en-US" smtClean="0"/>
-              <a:t>8/9/2020</a:t>
+              <a:t>8/10/2020</a:t>
             </a:fld>
             <a:endParaRPr lang="en-US"/>
           </a:p>
@@ -2811,7 +2811,7 @@
           <a:p>
             <a:fld id="{403BB6E5-7AA4-4C0D-BF97-BDC69083DBC9}" type="datetime1">
               <a:rPr lang="en-US" smtClean="0"/>
-              <a:t>8/9/2020</a:t>
+              <a:t>8/10/2020</a:t>
             </a:fld>
             <a:endParaRPr lang="en-US"/>
           </a:p>
@@ -3068,7 +3068,7 @@
           <a:p>
             <a:fld id="{5E5BBB4B-2F94-4F11-9AD4-28D0EBD25231}" type="datetime1">
               <a:rPr lang="en-US" smtClean="0"/>
-              <a:t>8/9/2020</a:t>
+              <a:t>8/10/2020</a:t>
             </a:fld>
             <a:endParaRPr lang="en-US"/>
           </a:p>
@@ -3367,7 +3367,7 @@
           <a:p>
             <a:fld id="{B79A5478-161F-4B28-93E5-DE9BF6B2D5E2}" type="datetime1">
               <a:rPr lang="en-US" smtClean="0"/>
-              <a:t>8/9/2020</a:t>
+              <a:t>8/10/2020</a:t>
             </a:fld>
             <a:endParaRPr lang="en-US"/>
           </a:p>
@@ -3805,7 +3805,7 @@
           <a:p>
             <a:fld id="{30E38055-F1C9-4AC4-B9E3-476EF82AD4CC}" type="datetime1">
               <a:rPr lang="en-US" smtClean="0"/>
-              <a:t>8/9/2020</a:t>
+              <a:t>8/10/2020</a:t>
             </a:fld>
             <a:endParaRPr lang="en-US"/>
           </a:p>
@@ -3934,7 +3934,7 @@
           <a:p>
             <a:fld id="{39D9E8B6-A1D4-4191-8D54-A8260B6A1972}" type="datetime1">
               <a:rPr lang="en-US" smtClean="0"/>
-              <a:t>8/9/2020</a:t>
+              <a:t>8/10/2020</a:t>
             </a:fld>
             <a:endParaRPr lang="en-US"/>
           </a:p>
@@ -4040,7 +4040,7 @@
           <a:p>
             <a:fld id="{924C1980-AF69-46D2-A9FE-14E6E6C939BE}" type="datetime1">
               <a:rPr lang="en-US" smtClean="0"/>
-              <a:t>8/9/2020</a:t>
+              <a:t>8/10/2020</a:t>
             </a:fld>
             <a:endParaRPr lang="en-US"/>
           </a:p>
@@ -4311,7 +4311,7 @@
           <a:p>
             <a:fld id="{AAA33C03-0194-466F-B287-AA772F5566B9}" type="datetime1">
               <a:rPr lang="en-US" smtClean="0"/>
-              <a:t>8/9/2020</a:t>
+              <a:t>8/10/2020</a:t>
             </a:fld>
             <a:endParaRPr lang="en-US"/>
           </a:p>
@@ -4577,7 +4577,7 @@
           <a:p>
             <a:fld id="{D31FF56F-D32E-44F3-A5D6-9F4533FAF9BD}" type="datetime1">
               <a:rPr lang="en-US" smtClean="0"/>
-              <a:t>8/9/2020</a:t>
+              <a:t>8/10/2020</a:t>
             </a:fld>
             <a:endParaRPr lang="en-US"/>
           </a:p>
@@ -4824,7 +4824,7 @@
           <a:p>
             <a:fld id="{0289C729-EC9D-4075-8A00-DCB3B3221814}" type="datetime1">
               <a:rPr lang="en-US" smtClean="0"/>
-              <a:t>8/9/2020</a:t>
+              <a:t>8/10/2020</a:t>
             </a:fld>
             <a:endParaRPr lang="en-US"/>
           </a:p>
@@ -8750,6 +8750,13 @@
   <p:clrMapOvr>
     <a:masterClrMapping/>
   </p:clrMapOvr>
+  <p:timing>
+    <p:tnLst>
+      <p:par>
+        <p:cTn id="1" dur="indefinite" restart="never" nodeType="tmRoot"/>
+      </p:par>
+    </p:tnLst>
+  </p:timing>
 </p:sld>
 </file>
 
@@ -8790,8 +8797,8 @@
               <a:t>Device Tree Basic </a:t>
             </a:r>
             <a:r>
-              <a:rPr lang="en-US" dirty="0" err="1" smtClean="0"/>
-              <a:t>syntaxc</a:t>
+              <a:rPr lang="en-US" dirty="0" smtClean="0"/>
+              <a:t>syntax</a:t>
             </a:r>
             <a:endParaRPr lang="en-US" dirty="0"/>
           </a:p>
@@ -9320,7 +9327,7 @@
               <a:t> </a:t>
             </a:r>
             <a:r>
-              <a:rPr lang="en-US" smtClean="0"/>
+              <a:rPr lang="en-US" dirty="0" err="1" smtClean="0"/>
               <a:t>nghĩa</a:t>
             </a:r>
             <a:endParaRPr lang="en-US" dirty="0" smtClean="0"/>

</xml_diff>